<commit_message>
last modif OAuth tech talk
</commit_message>
<xml_diff>
--- a/OAuth.pptx
+++ b/OAuth.pptx
@@ -217,7 +217,7 @@
           <a:p>
             <a:fld id="{F76712D5-9199-424C-A741-10937758135A}" type="datetimeFigureOut">
               <a:rPr lang="en-BE" smtClean="0"/>
-              <a:t>22/01/2024</a:t>
+              <a:t>23/01/2024</a:t>
             </a:fld>
             <a:endParaRPr lang="en-BE"/>
           </a:p>
@@ -535,7 +535,7 @@
           <a:noFill/>
           <a:extLst>
             <a:ext uri="{909E8E84-426E-40dd-AFC4-6F175D3DCCD1}">
-              <a14:hiddenFill xmlns="" xmlns:a14="http://schemas.microsoft.com/office/drawing/2010/main">
+              <a14:hiddenFill xmlns:a14="http://schemas.microsoft.com/office/drawing/2010/main" xmlns="">
                 <a:solidFill>
                   <a:srgbClr val="FFFFFF"/>
                 </a:solidFill>
@@ -595,7 +595,7 @@
             </a:ln>
             <a:extLst>
               <a:ext uri="{91240B29-F687-4f45-9708-019B960494DF}">
-                <a14:hiddenLine xmlns="" xmlns:a14="http://schemas.microsoft.com/office/drawing/2010/main" w="9525">
+                <a14:hiddenLine xmlns:a14="http://schemas.microsoft.com/office/drawing/2010/main" xmlns="" w="9525">
                   <a:solidFill>
                     <a:srgbClr val="000000"/>
                   </a:solidFill>
@@ -685,7 +685,7 @@
             </a:ln>
             <a:extLst>
               <a:ext uri="{91240B29-F687-4f45-9708-019B960494DF}">
-                <a14:hiddenLine xmlns="" xmlns:a14="http://schemas.microsoft.com/office/drawing/2010/main" w="9525">
+                <a14:hiddenLine xmlns:a14="http://schemas.microsoft.com/office/drawing/2010/main" xmlns="" w="9525">
                   <a:solidFill>
                     <a:srgbClr val="000000"/>
                   </a:solidFill>
@@ -775,7 +775,7 @@
             </a:ln>
             <a:extLst>
               <a:ext uri="{91240B29-F687-4f45-9708-019B960494DF}">
-                <a14:hiddenLine xmlns="" xmlns:a14="http://schemas.microsoft.com/office/drawing/2010/main" w="9525">
+                <a14:hiddenLine xmlns:a14="http://schemas.microsoft.com/office/drawing/2010/main" xmlns="" w="9525">
                   <a:solidFill>
                     <a:srgbClr val="000000"/>
                   </a:solidFill>
@@ -809,7 +809,7 @@
             </a:ln>
             <a:extLst>
               <a:ext uri="{91240B29-F687-4f45-9708-019B960494DF}">
-                <a14:hiddenLine xmlns="" xmlns:a14="http://schemas.microsoft.com/office/drawing/2010/main" w="9525">
+                <a14:hiddenLine xmlns:a14="http://schemas.microsoft.com/office/drawing/2010/main" xmlns="" w="9525">
                   <a:solidFill>
                     <a:srgbClr val="000000"/>
                   </a:solidFill>
@@ -899,7 +899,7 @@
             </a:ln>
             <a:extLst>
               <a:ext uri="{91240B29-F687-4f45-9708-019B960494DF}">
-                <a14:hiddenLine xmlns="" xmlns:a14="http://schemas.microsoft.com/office/drawing/2010/main" w="9525">
+                <a14:hiddenLine xmlns:a14="http://schemas.microsoft.com/office/drawing/2010/main" xmlns="" w="9525">
                   <a:solidFill>
                     <a:srgbClr val="000000"/>
                   </a:solidFill>
@@ -961,7 +961,7 @@
             </a:ln>
             <a:extLst>
               <a:ext uri="{91240B29-F687-4f45-9708-019B960494DF}">
-                <a14:hiddenLine xmlns="" xmlns:a14="http://schemas.microsoft.com/office/drawing/2010/main" w="9525">
+                <a14:hiddenLine xmlns:a14="http://schemas.microsoft.com/office/drawing/2010/main" xmlns="" w="9525">
                   <a:solidFill>
                     <a:srgbClr val="000000"/>
                   </a:solidFill>
@@ -1023,7 +1023,7 @@
             </a:ln>
             <a:extLst>
               <a:ext uri="{91240B29-F687-4f45-9708-019B960494DF}">
-                <a14:hiddenLine xmlns="" xmlns:a14="http://schemas.microsoft.com/office/drawing/2010/main" w="9525">
+                <a14:hiddenLine xmlns:a14="http://schemas.microsoft.com/office/drawing/2010/main" xmlns="" w="9525">
                   <a:solidFill>
                     <a:srgbClr val="000000"/>
                   </a:solidFill>
@@ -1113,7 +1113,7 @@
             </a:ln>
             <a:extLst>
               <a:ext uri="{91240B29-F687-4f45-9708-019B960494DF}">
-                <a14:hiddenLine xmlns="" xmlns:a14="http://schemas.microsoft.com/office/drawing/2010/main" w="9525">
+                <a14:hiddenLine xmlns:a14="http://schemas.microsoft.com/office/drawing/2010/main" xmlns="" w="9525">
                   <a:solidFill>
                     <a:srgbClr val="000000"/>
                   </a:solidFill>
@@ -1175,7 +1175,7 @@
             </a:ln>
             <a:extLst>
               <a:ext uri="{91240B29-F687-4f45-9708-019B960494DF}">
-                <a14:hiddenLine xmlns="" xmlns:a14="http://schemas.microsoft.com/office/drawing/2010/main" w="9525">
+                <a14:hiddenLine xmlns:a14="http://schemas.microsoft.com/office/drawing/2010/main" xmlns="" w="9525">
                   <a:solidFill>
                     <a:srgbClr val="000000"/>
                   </a:solidFill>
@@ -1237,7 +1237,7 @@
             </a:ln>
             <a:extLst>
               <a:ext uri="{91240B29-F687-4f45-9708-019B960494DF}">
-                <a14:hiddenLine xmlns="" xmlns:a14="http://schemas.microsoft.com/office/drawing/2010/main" w="9525">
+                <a14:hiddenLine xmlns:a14="http://schemas.microsoft.com/office/drawing/2010/main" xmlns="" w="9525">
                   <a:solidFill>
                     <a:srgbClr val="000000"/>
                   </a:solidFill>
@@ -1327,7 +1327,7 @@
             </a:ln>
             <a:extLst>
               <a:ext uri="{91240B29-F687-4f45-9708-019B960494DF}">
-                <a14:hiddenLine xmlns="" xmlns:a14="http://schemas.microsoft.com/office/drawing/2010/main" w="9525">
+                <a14:hiddenLine xmlns:a14="http://schemas.microsoft.com/office/drawing/2010/main" xmlns="" w="9525">
                   <a:solidFill>
                     <a:srgbClr val="000000"/>
                   </a:solidFill>
@@ -1417,7 +1417,7 @@
             </a:ln>
             <a:extLst>
               <a:ext uri="{91240B29-F687-4f45-9708-019B960494DF}">
-                <a14:hiddenLine xmlns="" xmlns:a14="http://schemas.microsoft.com/office/drawing/2010/main" w="9525">
+                <a14:hiddenLine xmlns:a14="http://schemas.microsoft.com/office/drawing/2010/main" xmlns="" w="9525">
                   <a:solidFill>
                     <a:srgbClr val="000000"/>
                   </a:solidFill>
@@ -1479,7 +1479,7 @@
             </a:ln>
             <a:extLst>
               <a:ext uri="{91240B29-F687-4f45-9708-019B960494DF}">
-                <a14:hiddenLine xmlns="" xmlns:a14="http://schemas.microsoft.com/office/drawing/2010/main" w="9525">
+                <a14:hiddenLine xmlns:a14="http://schemas.microsoft.com/office/drawing/2010/main" xmlns="" w="9525">
                   <a:solidFill>
                     <a:srgbClr val="000000"/>
                   </a:solidFill>
@@ -1589,7 +1589,7 @@
             </a:ln>
             <a:extLst>
               <a:ext uri="{91240B29-F687-4f45-9708-019B960494DF}">
-                <a14:hiddenLine xmlns="" xmlns:a14="http://schemas.microsoft.com/office/drawing/2010/main" w="9525">
+                <a14:hiddenLine xmlns:a14="http://schemas.microsoft.com/office/drawing/2010/main" xmlns="" w="9525">
                   <a:solidFill>
                     <a:srgbClr val="000000"/>
                   </a:solidFill>
@@ -1651,7 +1651,7 @@
             </a:ln>
             <a:extLst>
               <a:ext uri="{91240B29-F687-4f45-9708-019B960494DF}">
-                <a14:hiddenLine xmlns="" xmlns:a14="http://schemas.microsoft.com/office/drawing/2010/main" w="9525">
+                <a14:hiddenLine xmlns:a14="http://schemas.microsoft.com/office/drawing/2010/main" xmlns="" w="9525">
                   <a:solidFill>
                     <a:srgbClr val="000000"/>
                   </a:solidFill>
@@ -1741,7 +1741,7 @@
             </a:ln>
             <a:extLst>
               <a:ext uri="{91240B29-F687-4f45-9708-019B960494DF}">
-                <a14:hiddenLine xmlns="" xmlns:a14="http://schemas.microsoft.com/office/drawing/2010/main" w="9525">
+                <a14:hiddenLine xmlns:a14="http://schemas.microsoft.com/office/drawing/2010/main" xmlns="" w="9525">
                   <a:solidFill>
                     <a:srgbClr val="000000"/>
                   </a:solidFill>
@@ -1831,7 +1831,7 @@
             </a:ln>
             <a:extLst>
               <a:ext uri="{91240B29-F687-4f45-9708-019B960494DF}">
-                <a14:hiddenLine xmlns="" xmlns:a14="http://schemas.microsoft.com/office/drawing/2010/main" w="9525">
+                <a14:hiddenLine xmlns:a14="http://schemas.microsoft.com/office/drawing/2010/main" xmlns="" w="9525">
                   <a:solidFill>
                     <a:srgbClr val="000000"/>
                   </a:solidFill>
@@ -1893,7 +1893,7 @@
             </a:ln>
             <a:extLst>
               <a:ext uri="{91240B29-F687-4f45-9708-019B960494DF}">
-                <a14:hiddenLine xmlns="" xmlns:a14="http://schemas.microsoft.com/office/drawing/2010/main" w="9525">
+                <a14:hiddenLine xmlns:a14="http://schemas.microsoft.com/office/drawing/2010/main" xmlns="" w="9525">
                   <a:solidFill>
                     <a:srgbClr val="000000"/>
                   </a:solidFill>
@@ -1983,7 +1983,7 @@
             </a:ln>
             <a:extLst>
               <a:ext uri="{91240B29-F687-4f45-9708-019B960494DF}">
-                <a14:hiddenLine xmlns="" xmlns:a14="http://schemas.microsoft.com/office/drawing/2010/main" w="9525">
+                <a14:hiddenLine xmlns:a14="http://schemas.microsoft.com/office/drawing/2010/main" xmlns="" w="9525">
                   <a:solidFill>
                     <a:srgbClr val="000000"/>
                   </a:solidFill>
@@ -2073,7 +2073,7 @@
             </a:ln>
             <a:extLst>
               <a:ext uri="{91240B29-F687-4f45-9708-019B960494DF}">
-                <a14:hiddenLine xmlns="" xmlns:a14="http://schemas.microsoft.com/office/drawing/2010/main" w="9525">
+                <a14:hiddenLine xmlns:a14="http://schemas.microsoft.com/office/drawing/2010/main" xmlns="" w="9525">
                   <a:solidFill>
                     <a:srgbClr val="000000"/>
                   </a:solidFill>
@@ -2129,7 +2129,7 @@
             </a:ln>
             <a:extLst>
               <a:ext uri="{91240B29-F687-4f45-9708-019B960494DF}">
-                <a14:hiddenLine xmlns="" xmlns:a14="http://schemas.microsoft.com/office/drawing/2010/main" w="9525">
+                <a14:hiddenLine xmlns:a14="http://schemas.microsoft.com/office/drawing/2010/main" xmlns="" w="9525">
                   <a:solidFill>
                     <a:srgbClr val="000000"/>
                   </a:solidFill>
@@ -2219,7 +2219,7 @@
             </a:ln>
             <a:extLst>
               <a:ext uri="{91240B29-F687-4f45-9708-019B960494DF}">
-                <a14:hiddenLine xmlns="" xmlns:a14="http://schemas.microsoft.com/office/drawing/2010/main" w="9525">
+                <a14:hiddenLine xmlns:a14="http://schemas.microsoft.com/office/drawing/2010/main" xmlns="" w="9525">
                   <a:solidFill>
                     <a:srgbClr val="000000"/>
                   </a:solidFill>
@@ -2275,7 +2275,7 @@
             </a:ln>
             <a:extLst>
               <a:ext uri="{91240B29-F687-4f45-9708-019B960494DF}">
-                <a14:hiddenLine xmlns="" xmlns:a14="http://schemas.microsoft.com/office/drawing/2010/main" w="9525">
+                <a14:hiddenLine xmlns:a14="http://schemas.microsoft.com/office/drawing/2010/main" xmlns="" w="9525">
                   <a:solidFill>
                     <a:srgbClr val="000000"/>
                   </a:solidFill>
@@ -2365,7 +2365,7 @@
             </a:ln>
             <a:extLst>
               <a:ext uri="{91240B29-F687-4f45-9708-019B960494DF}">
-                <a14:hiddenLine xmlns="" xmlns:a14="http://schemas.microsoft.com/office/drawing/2010/main" w="9525">
+                <a14:hiddenLine xmlns:a14="http://schemas.microsoft.com/office/drawing/2010/main" xmlns="" w="9525">
                   <a:solidFill>
                     <a:srgbClr val="000000"/>
                   </a:solidFill>
@@ -2433,7 +2433,7 @@
             </a:ln>
             <a:extLst>
               <a:ext uri="{91240B29-F687-4f45-9708-019B960494DF}">
-                <a14:hiddenLine xmlns="" xmlns:a14="http://schemas.microsoft.com/office/drawing/2010/main" w="9525">
+                <a14:hiddenLine xmlns:a14="http://schemas.microsoft.com/office/drawing/2010/main" xmlns="" w="9525">
                   <a:solidFill>
                     <a:srgbClr val="000000"/>
                   </a:solidFill>
@@ -2523,7 +2523,7 @@
             </a:ln>
             <a:extLst>
               <a:ext uri="{91240B29-F687-4f45-9708-019B960494DF}">
-                <a14:hiddenLine xmlns="" xmlns:a14="http://schemas.microsoft.com/office/drawing/2010/main" w="9525">
+                <a14:hiddenLine xmlns:a14="http://schemas.microsoft.com/office/drawing/2010/main" xmlns="" w="9525">
                   <a:solidFill>
                     <a:srgbClr val="000000"/>
                   </a:solidFill>
@@ -2591,7 +2591,7 @@
             </a:ln>
             <a:extLst>
               <a:ext uri="{91240B29-F687-4f45-9708-019B960494DF}">
-                <a14:hiddenLine xmlns="" xmlns:a14="http://schemas.microsoft.com/office/drawing/2010/main" w="9525">
+                <a14:hiddenLine xmlns:a14="http://schemas.microsoft.com/office/drawing/2010/main" xmlns="" w="9525">
                   <a:solidFill>
                     <a:srgbClr val="000000"/>
                   </a:solidFill>
@@ -2681,7 +2681,7 @@
             </a:ln>
             <a:extLst>
               <a:ext uri="{91240B29-F687-4f45-9708-019B960494DF}">
-                <a14:hiddenLine xmlns="" xmlns:a14="http://schemas.microsoft.com/office/drawing/2010/main" w="9525">
+                <a14:hiddenLine xmlns:a14="http://schemas.microsoft.com/office/drawing/2010/main" xmlns="" w="9525">
                   <a:solidFill>
                     <a:srgbClr val="000000"/>
                   </a:solidFill>
@@ -2715,7 +2715,7 @@
             </a:ln>
             <a:extLst>
               <a:ext uri="{91240B29-F687-4f45-9708-019B960494DF}">
-                <a14:hiddenLine xmlns="" xmlns:a14="http://schemas.microsoft.com/office/drawing/2010/main" w="9525">
+                <a14:hiddenLine xmlns:a14="http://schemas.microsoft.com/office/drawing/2010/main" xmlns="" w="9525">
                   <a:solidFill>
                     <a:srgbClr val="000000"/>
                   </a:solidFill>
@@ -2805,7 +2805,7 @@
             </a:ln>
             <a:extLst>
               <a:ext uri="{91240B29-F687-4f45-9708-019B960494DF}">
-                <a14:hiddenLine xmlns="" xmlns:a14="http://schemas.microsoft.com/office/drawing/2010/main" w="9525">
+                <a14:hiddenLine xmlns:a14="http://schemas.microsoft.com/office/drawing/2010/main" xmlns="" w="9525">
                   <a:solidFill>
                     <a:srgbClr val="000000"/>
                   </a:solidFill>
@@ -2867,7 +2867,7 @@
             </a:ln>
             <a:extLst>
               <a:ext uri="{91240B29-F687-4f45-9708-019B960494DF}">
-                <a14:hiddenLine xmlns="" xmlns:a14="http://schemas.microsoft.com/office/drawing/2010/main" w="9525">
+                <a14:hiddenLine xmlns:a14="http://schemas.microsoft.com/office/drawing/2010/main" xmlns="" w="9525">
                   <a:solidFill>
                     <a:srgbClr val="000000"/>
                   </a:solidFill>
@@ -2929,7 +2929,7 @@
             </a:ln>
             <a:extLst>
               <a:ext uri="{91240B29-F687-4f45-9708-019B960494DF}">
-                <a14:hiddenLine xmlns="" xmlns:a14="http://schemas.microsoft.com/office/drawing/2010/main" w="9525">
+                <a14:hiddenLine xmlns:a14="http://schemas.microsoft.com/office/drawing/2010/main" xmlns="" w="9525">
                   <a:solidFill>
                     <a:srgbClr val="000000"/>
                   </a:solidFill>
@@ -3019,7 +3019,7 @@
             </a:ln>
             <a:extLst>
               <a:ext uri="{91240B29-F687-4f45-9708-019B960494DF}">
-                <a14:hiddenLine xmlns="" xmlns:a14="http://schemas.microsoft.com/office/drawing/2010/main" w="9525">
+                <a14:hiddenLine xmlns:a14="http://schemas.microsoft.com/office/drawing/2010/main" xmlns="" w="9525">
                   <a:solidFill>
                     <a:srgbClr val="000000"/>
                   </a:solidFill>
@@ -3087,7 +3087,7 @@
             </a:ln>
             <a:extLst>
               <a:ext uri="{91240B29-F687-4f45-9708-019B960494DF}">
-                <a14:hiddenLine xmlns="" xmlns:a14="http://schemas.microsoft.com/office/drawing/2010/main" w="9525">
+                <a14:hiddenLine xmlns:a14="http://schemas.microsoft.com/office/drawing/2010/main" xmlns="" w="9525">
                   <a:solidFill>
                     <a:srgbClr val="000000"/>
                   </a:solidFill>
@@ -3149,7 +3149,7 @@
             </a:ln>
             <a:extLst>
               <a:ext uri="{91240B29-F687-4f45-9708-019B960494DF}">
-                <a14:hiddenLine xmlns="" xmlns:a14="http://schemas.microsoft.com/office/drawing/2010/main" w="9525">
+                <a14:hiddenLine xmlns:a14="http://schemas.microsoft.com/office/drawing/2010/main" xmlns="" w="9525">
                   <a:solidFill>
                     <a:srgbClr val="000000"/>
                   </a:solidFill>
@@ -3239,7 +3239,7 @@
             </a:ln>
             <a:extLst>
               <a:ext uri="{91240B29-F687-4f45-9708-019B960494DF}">
-                <a14:hiddenLine xmlns="" xmlns:a14="http://schemas.microsoft.com/office/drawing/2010/main" w="9525">
+                <a14:hiddenLine xmlns:a14="http://schemas.microsoft.com/office/drawing/2010/main" xmlns="" w="9525">
                   <a:solidFill>
                     <a:srgbClr val="000000"/>
                   </a:solidFill>
@@ -3301,7 +3301,7 @@
             </a:ln>
             <a:extLst>
               <a:ext uri="{91240B29-F687-4f45-9708-019B960494DF}">
-                <a14:hiddenLine xmlns="" xmlns:a14="http://schemas.microsoft.com/office/drawing/2010/main" w="9525">
+                <a14:hiddenLine xmlns:a14="http://schemas.microsoft.com/office/drawing/2010/main" xmlns="" w="9525">
                   <a:solidFill>
                     <a:srgbClr val="000000"/>
                   </a:solidFill>
@@ -3391,7 +3391,7 @@
             </a:ln>
             <a:extLst>
               <a:ext uri="{91240B29-F687-4f45-9708-019B960494DF}">
-                <a14:hiddenLine xmlns="" xmlns:a14="http://schemas.microsoft.com/office/drawing/2010/main" w="9525">
+                <a14:hiddenLine xmlns:a14="http://schemas.microsoft.com/office/drawing/2010/main" xmlns="" w="9525">
                   <a:solidFill>
                     <a:srgbClr val="000000"/>
                   </a:solidFill>
@@ -3453,7 +3453,7 @@
             </a:ln>
             <a:extLst>
               <a:ext uri="{91240B29-F687-4f45-9708-019B960494DF}">
-                <a14:hiddenLine xmlns="" xmlns:a14="http://schemas.microsoft.com/office/drawing/2010/main" w="9525">
+                <a14:hiddenLine xmlns:a14="http://schemas.microsoft.com/office/drawing/2010/main" xmlns="" w="9525">
                   <a:solidFill>
                     <a:srgbClr val="000000"/>
                   </a:solidFill>
@@ -3543,7 +3543,7 @@
             </a:ln>
             <a:extLst>
               <a:ext uri="{91240B29-F687-4f45-9708-019B960494DF}">
-                <a14:hiddenLine xmlns="" xmlns:a14="http://schemas.microsoft.com/office/drawing/2010/main" w="9525">
+                <a14:hiddenLine xmlns:a14="http://schemas.microsoft.com/office/drawing/2010/main" xmlns="" w="9525">
                   <a:solidFill>
                     <a:srgbClr val="000000"/>
                   </a:solidFill>
@@ -3577,7 +3577,7 @@
             </a:ln>
             <a:extLst>
               <a:ext uri="{91240B29-F687-4f45-9708-019B960494DF}">
-                <a14:hiddenLine xmlns="" xmlns:a14="http://schemas.microsoft.com/office/drawing/2010/main" w="9525">
+                <a14:hiddenLine xmlns:a14="http://schemas.microsoft.com/office/drawing/2010/main" xmlns="" w="9525">
                   <a:solidFill>
                     <a:srgbClr val="000000"/>
                   </a:solidFill>
@@ -3642,7 +3642,7 @@
             </a:ln>
             <a:extLst>
               <a:ext uri="{91240B29-F687-4f45-9708-019B960494DF}">
-                <a14:hiddenLine xmlns="" xmlns:a14="http://schemas.microsoft.com/office/drawing/2010/main" w="9525">
+                <a14:hiddenLine xmlns:a14="http://schemas.microsoft.com/office/drawing/2010/main" xmlns="" w="9525">
                   <a:solidFill>
                     <a:srgbClr val="000000"/>
                   </a:solidFill>
@@ -3732,7 +3732,7 @@
             </a:ln>
             <a:extLst>
               <a:ext uri="{91240B29-F687-4f45-9708-019B960494DF}">
-                <a14:hiddenLine xmlns="" xmlns:a14="http://schemas.microsoft.com/office/drawing/2010/main" w="9525">
+                <a14:hiddenLine xmlns:a14="http://schemas.microsoft.com/office/drawing/2010/main" xmlns="" w="9525">
                   <a:solidFill>
                     <a:srgbClr val="000000"/>
                   </a:solidFill>
@@ -3794,7 +3794,7 @@
             </a:ln>
             <a:extLst>
               <a:ext uri="{91240B29-F687-4f45-9708-019B960494DF}">
-                <a14:hiddenLine xmlns="" xmlns:a14="http://schemas.microsoft.com/office/drawing/2010/main" w="9525">
+                <a14:hiddenLine xmlns:a14="http://schemas.microsoft.com/office/drawing/2010/main" xmlns="" w="9525">
                   <a:solidFill>
                     <a:srgbClr val="000000"/>
                   </a:solidFill>
@@ -3884,7 +3884,7 @@
             </a:ln>
             <a:extLst>
               <a:ext uri="{91240B29-F687-4f45-9708-019B960494DF}">
-                <a14:hiddenLine xmlns="" xmlns:a14="http://schemas.microsoft.com/office/drawing/2010/main" w="9525">
+                <a14:hiddenLine xmlns:a14="http://schemas.microsoft.com/office/drawing/2010/main" xmlns="" w="9525">
                   <a:solidFill>
                     <a:srgbClr val="000000"/>
                   </a:solidFill>
@@ -3974,7 +3974,7 @@
             </a:ln>
             <a:extLst>
               <a:ext uri="{91240B29-F687-4f45-9708-019B960494DF}">
-                <a14:hiddenLine xmlns="" xmlns:a14="http://schemas.microsoft.com/office/drawing/2010/main" w="9525">
+                <a14:hiddenLine xmlns:a14="http://schemas.microsoft.com/office/drawing/2010/main" xmlns="" w="9525">
                   <a:solidFill>
                     <a:srgbClr val="000000"/>
                   </a:solidFill>
@@ -4039,7 +4039,7 @@
             </a:ln>
             <a:extLst>
               <a:ext uri="{91240B29-F687-4f45-9708-019B960494DF}">
-                <a14:hiddenLine xmlns="" xmlns:a14="http://schemas.microsoft.com/office/drawing/2010/main" w="9525">
+                <a14:hiddenLine xmlns:a14="http://schemas.microsoft.com/office/drawing/2010/main" xmlns="" w="9525">
                   <a:solidFill>
                     <a:srgbClr val="000000"/>
                   </a:solidFill>
@@ -4101,7 +4101,7 @@
             </a:ln>
             <a:extLst>
               <a:ext uri="{91240B29-F687-4f45-9708-019B960494DF}">
-                <a14:hiddenLine xmlns="" xmlns:a14="http://schemas.microsoft.com/office/drawing/2010/main" w="9525">
+                <a14:hiddenLine xmlns:a14="http://schemas.microsoft.com/office/drawing/2010/main" xmlns="" w="9525">
                   <a:solidFill>
                     <a:srgbClr val="000000"/>
                   </a:solidFill>
@@ -4191,7 +4191,7 @@
             </a:ln>
             <a:extLst>
               <a:ext uri="{91240B29-F687-4f45-9708-019B960494DF}">
-                <a14:hiddenLine xmlns="" xmlns:a14="http://schemas.microsoft.com/office/drawing/2010/main" w="9525">
+                <a14:hiddenLine xmlns:a14="http://schemas.microsoft.com/office/drawing/2010/main" xmlns="" w="9525">
                   <a:solidFill>
                     <a:srgbClr val="000000"/>
                   </a:solidFill>
@@ -4281,7 +4281,7 @@
             </a:ln>
             <a:extLst>
               <a:ext uri="{91240B29-F687-4f45-9708-019B960494DF}">
-                <a14:hiddenLine xmlns="" xmlns:a14="http://schemas.microsoft.com/office/drawing/2010/main" w="9525">
+                <a14:hiddenLine xmlns:a14="http://schemas.microsoft.com/office/drawing/2010/main" xmlns="" w="9525">
                   <a:solidFill>
                     <a:srgbClr val="000000"/>
                   </a:solidFill>
@@ -4343,7 +4343,7 @@
             </a:ln>
             <a:extLst>
               <a:ext uri="{91240B29-F687-4f45-9708-019B960494DF}">
-                <a14:hiddenLine xmlns="" xmlns:a14="http://schemas.microsoft.com/office/drawing/2010/main" w="9525">
+                <a14:hiddenLine xmlns:a14="http://schemas.microsoft.com/office/drawing/2010/main" xmlns="" w="9525">
                   <a:solidFill>
                     <a:srgbClr val="000000"/>
                   </a:solidFill>
@@ -4463,7 +4463,7 @@
             </a:ln>
             <a:extLst>
               <a:ext uri="{91240B29-F687-4f45-9708-019B960494DF}">
-                <a14:hiddenLine xmlns="" xmlns:a14="http://schemas.microsoft.com/office/drawing/2010/main" w="9525">
+                <a14:hiddenLine xmlns:a14="http://schemas.microsoft.com/office/drawing/2010/main" xmlns="" w="9525">
                   <a:solidFill>
                     <a:srgbClr val="000000"/>
                   </a:solidFill>
@@ -4531,7 +4531,7 @@
             </a:ln>
             <a:extLst>
               <a:ext uri="{91240B29-F687-4f45-9708-019B960494DF}">
-                <a14:hiddenLine xmlns="" xmlns:a14="http://schemas.microsoft.com/office/drawing/2010/main" w="9525">
+                <a14:hiddenLine xmlns:a14="http://schemas.microsoft.com/office/drawing/2010/main" xmlns="" w="9525">
                   <a:solidFill>
                     <a:srgbClr val="000000"/>
                   </a:solidFill>
@@ -4621,7 +4621,7 @@
             </a:ln>
             <a:extLst>
               <a:ext uri="{91240B29-F687-4f45-9708-019B960494DF}">
-                <a14:hiddenLine xmlns="" xmlns:a14="http://schemas.microsoft.com/office/drawing/2010/main" w="9525">
+                <a14:hiddenLine xmlns:a14="http://schemas.microsoft.com/office/drawing/2010/main" xmlns="" w="9525">
                   <a:solidFill>
                     <a:srgbClr val="000000"/>
                   </a:solidFill>
@@ -4761,7 +4761,7 @@
           <a:p>
             <a:fld id="{39FE0B3A-34ED-40B6-BAE9-507955185073}" type="datetimeFigureOut">
               <a:rPr lang="en-BE" smtClean="0"/>
-              <a:t>21/01/2024</a:t>
+              <a:t>23/01/2024</a:t>
             </a:fld>
             <a:endParaRPr lang="en-BE"/>
           </a:p>
@@ -5028,7 +5028,7 @@
           <a:p>
             <a:fld id="{39FE0B3A-34ED-40B6-BAE9-507955185073}" type="datetimeFigureOut">
               <a:rPr lang="en-BE" smtClean="0"/>
-              <a:t>21/01/2024</a:t>
+              <a:t>23/01/2024</a:t>
             </a:fld>
             <a:endParaRPr lang="en-BE"/>
           </a:p>
@@ -5224,7 +5224,7 @@
           <a:p>
             <a:fld id="{39FE0B3A-34ED-40B6-BAE9-507955185073}" type="datetimeFigureOut">
               <a:rPr lang="en-BE" smtClean="0"/>
-              <a:t>21/01/2024</a:t>
+              <a:t>23/01/2024</a:t>
             </a:fld>
             <a:endParaRPr lang="en-BE"/>
           </a:p>
@@ -5487,7 +5487,7 @@
           <a:p>
             <a:fld id="{39FE0B3A-34ED-40B6-BAE9-507955185073}" type="datetimeFigureOut">
               <a:rPr lang="en-BE" smtClean="0"/>
-              <a:t>21/01/2024</a:t>
+              <a:t>23/01/2024</a:t>
             </a:fld>
             <a:endParaRPr lang="en-BE"/>
           </a:p>
@@ -5921,7 +5921,7 @@
           <a:p>
             <a:fld id="{39FE0B3A-34ED-40B6-BAE9-507955185073}" type="datetimeFigureOut">
               <a:rPr lang="en-BE" smtClean="0"/>
-              <a:t>21/01/2024</a:t>
+              <a:t>23/01/2024</a:t>
             </a:fld>
             <a:endParaRPr lang="en-BE"/>
           </a:p>
@@ -6467,7 +6467,7 @@
           <a:p>
             <a:fld id="{39FE0B3A-34ED-40B6-BAE9-507955185073}" type="datetimeFigureOut">
               <a:rPr lang="en-BE" smtClean="0"/>
-              <a:t>21/01/2024</a:t>
+              <a:t>23/01/2024</a:t>
             </a:fld>
             <a:endParaRPr lang="en-BE"/>
           </a:p>
@@ -7187,7 +7187,7 @@
           <a:p>
             <a:fld id="{39FE0B3A-34ED-40B6-BAE9-507955185073}" type="datetimeFigureOut">
               <a:rPr lang="en-BE" smtClean="0"/>
-              <a:t>21/01/2024</a:t>
+              <a:t>23/01/2024</a:t>
             </a:fld>
             <a:endParaRPr lang="en-BE"/>
           </a:p>
@@ -7357,7 +7357,7 @@
           <a:p>
             <a:fld id="{39FE0B3A-34ED-40B6-BAE9-507955185073}" type="datetimeFigureOut">
               <a:rPr lang="en-BE" smtClean="0"/>
-              <a:t>21/01/2024</a:t>
+              <a:t>23/01/2024</a:t>
             </a:fld>
             <a:endParaRPr lang="en-BE"/>
           </a:p>
@@ -7537,7 +7537,7 @@
           <a:p>
             <a:fld id="{39FE0B3A-34ED-40B6-BAE9-507955185073}" type="datetimeFigureOut">
               <a:rPr lang="en-BE" smtClean="0"/>
-              <a:t>21/01/2024</a:t>
+              <a:t>23/01/2024</a:t>
             </a:fld>
             <a:endParaRPr lang="en-BE"/>
           </a:p>
@@ -7707,7 +7707,7 @@
           <a:p>
             <a:fld id="{39FE0B3A-34ED-40B6-BAE9-507955185073}" type="datetimeFigureOut">
               <a:rPr lang="en-BE" smtClean="0"/>
-              <a:t>21/01/2024</a:t>
+              <a:t>23/01/2024</a:t>
             </a:fld>
             <a:endParaRPr lang="en-BE"/>
           </a:p>
@@ -7957,7 +7957,7 @@
           <a:p>
             <a:fld id="{39FE0B3A-34ED-40B6-BAE9-507955185073}" type="datetimeFigureOut">
               <a:rPr lang="en-BE" smtClean="0"/>
-              <a:t>21/01/2024</a:t>
+              <a:t>23/01/2024</a:t>
             </a:fld>
             <a:endParaRPr lang="en-BE"/>
           </a:p>
@@ -8189,7 +8189,7 @@
           <a:p>
             <a:fld id="{39FE0B3A-34ED-40B6-BAE9-507955185073}" type="datetimeFigureOut">
               <a:rPr lang="en-BE" smtClean="0"/>
-              <a:t>21/01/2024</a:t>
+              <a:t>23/01/2024</a:t>
             </a:fld>
             <a:endParaRPr lang="en-BE"/>
           </a:p>
@@ -8570,7 +8570,7 @@
           <a:p>
             <a:fld id="{39FE0B3A-34ED-40B6-BAE9-507955185073}" type="datetimeFigureOut">
               <a:rPr lang="en-BE" smtClean="0"/>
-              <a:t>21/01/2024</a:t>
+              <a:t>23/01/2024</a:t>
             </a:fld>
             <a:endParaRPr lang="en-BE"/>
           </a:p>
@@ -8688,7 +8688,7 @@
           <a:p>
             <a:fld id="{39FE0B3A-34ED-40B6-BAE9-507955185073}" type="datetimeFigureOut">
               <a:rPr lang="en-BE" smtClean="0"/>
-              <a:t>21/01/2024</a:t>
+              <a:t>23/01/2024</a:t>
             </a:fld>
             <a:endParaRPr lang="en-BE"/>
           </a:p>
@@ -8783,7 +8783,7 @@
           <a:p>
             <a:fld id="{39FE0B3A-34ED-40B6-BAE9-507955185073}" type="datetimeFigureOut">
               <a:rPr lang="en-BE" smtClean="0"/>
-              <a:t>21/01/2024</a:t>
+              <a:t>23/01/2024</a:t>
             </a:fld>
             <a:endParaRPr lang="en-BE"/>
           </a:p>
@@ -9032,7 +9032,7 @@
           <a:p>
             <a:fld id="{39FE0B3A-34ED-40B6-BAE9-507955185073}" type="datetimeFigureOut">
               <a:rPr lang="en-BE" smtClean="0"/>
-              <a:t>21/01/2024</a:t>
+              <a:t>23/01/2024</a:t>
             </a:fld>
             <a:endParaRPr lang="en-BE"/>
           </a:p>
@@ -9312,7 +9312,7 @@
           <a:p>
             <a:fld id="{39FE0B3A-34ED-40B6-BAE9-507955185073}" type="datetimeFigureOut">
               <a:rPr lang="en-BE" smtClean="0"/>
-              <a:t>21/01/2024</a:t>
+              <a:t>23/01/2024</a:t>
             </a:fld>
             <a:endParaRPr lang="en-BE"/>
           </a:p>
@@ -9428,7 +9428,7 @@
           <a:noFill/>
           <a:extLst>
             <a:ext uri="{909E8E84-426E-40dd-AFC4-6F175D3DCCD1}">
-              <a14:hiddenFill xmlns="" xmlns:a14="http://schemas.microsoft.com/office/drawing/2010/main">
+              <a14:hiddenFill xmlns:a14="http://schemas.microsoft.com/office/drawing/2010/main" xmlns="">
                 <a:solidFill>
                   <a:srgbClr val="FFFFFF"/>
                 </a:solidFill>
@@ -9502,7 +9502,7 @@
               </a:ln>
               <a:extLst>
                 <a:ext uri="{91240B29-F687-4f45-9708-019B960494DF}">
-                  <a14:hiddenLine xmlns="" xmlns:a14="http://schemas.microsoft.com/office/drawing/2010/main" w="9525">
+                  <a14:hiddenLine xmlns:a14="http://schemas.microsoft.com/office/drawing/2010/main" xmlns="" w="9525">
                     <a:solidFill>
                       <a:srgbClr val="000000"/>
                     </a:solidFill>
@@ -9592,7 +9592,7 @@
               </a:ln>
               <a:extLst>
                 <a:ext uri="{91240B29-F687-4f45-9708-019B960494DF}">
-                  <a14:hiddenLine xmlns="" xmlns:a14="http://schemas.microsoft.com/office/drawing/2010/main" w="9525">
+                  <a14:hiddenLine xmlns:a14="http://schemas.microsoft.com/office/drawing/2010/main" xmlns="" w="9525">
                     <a:solidFill>
                       <a:srgbClr val="000000"/>
                     </a:solidFill>
@@ -9682,7 +9682,7 @@
               </a:ln>
               <a:extLst>
                 <a:ext uri="{91240B29-F687-4f45-9708-019B960494DF}">
-                  <a14:hiddenLine xmlns="" xmlns:a14="http://schemas.microsoft.com/office/drawing/2010/main" w="9525">
+                  <a14:hiddenLine xmlns:a14="http://schemas.microsoft.com/office/drawing/2010/main" xmlns="" w="9525">
                     <a:solidFill>
                       <a:srgbClr val="000000"/>
                     </a:solidFill>
@@ -9744,7 +9744,7 @@
               </a:ln>
               <a:extLst>
                 <a:ext uri="{91240B29-F687-4f45-9708-019B960494DF}">
-                  <a14:hiddenLine xmlns="" xmlns:a14="http://schemas.microsoft.com/office/drawing/2010/main" w="9525">
+                  <a14:hiddenLine xmlns:a14="http://schemas.microsoft.com/office/drawing/2010/main" xmlns="" w="9525">
                     <a:solidFill>
                       <a:srgbClr val="000000"/>
                     </a:solidFill>
@@ -9834,7 +9834,7 @@
               </a:ln>
               <a:extLst>
                 <a:ext uri="{91240B29-F687-4f45-9708-019B960494DF}">
-                  <a14:hiddenLine xmlns="" xmlns:a14="http://schemas.microsoft.com/office/drawing/2010/main" w="9525">
+                  <a14:hiddenLine xmlns:a14="http://schemas.microsoft.com/office/drawing/2010/main" xmlns="" w="9525">
                     <a:solidFill>
                       <a:srgbClr val="000000"/>
                     </a:solidFill>
@@ -9896,7 +9896,7 @@
               </a:ln>
               <a:extLst>
                 <a:ext uri="{91240B29-F687-4f45-9708-019B960494DF}">
-                  <a14:hiddenLine xmlns="" xmlns:a14="http://schemas.microsoft.com/office/drawing/2010/main" w="9525">
+                  <a14:hiddenLine xmlns:a14="http://schemas.microsoft.com/office/drawing/2010/main" xmlns="" w="9525">
                     <a:solidFill>
                       <a:srgbClr val="000000"/>
                     </a:solidFill>
@@ -9958,7 +9958,7 @@
               </a:ln>
               <a:extLst>
                 <a:ext uri="{91240B29-F687-4f45-9708-019B960494DF}">
-                  <a14:hiddenLine xmlns="" xmlns:a14="http://schemas.microsoft.com/office/drawing/2010/main" w="9525">
+                  <a14:hiddenLine xmlns:a14="http://schemas.microsoft.com/office/drawing/2010/main" xmlns="" w="9525">
                     <a:solidFill>
                       <a:srgbClr val="000000"/>
                     </a:solidFill>
@@ -10048,7 +10048,7 @@
               </a:ln>
               <a:extLst>
                 <a:ext uri="{91240B29-F687-4f45-9708-019B960494DF}">
-                  <a14:hiddenLine xmlns="" xmlns:a14="http://schemas.microsoft.com/office/drawing/2010/main" w="9525">
+                  <a14:hiddenLine xmlns:a14="http://schemas.microsoft.com/office/drawing/2010/main" xmlns="" w="9525">
                     <a:solidFill>
                       <a:srgbClr val="000000"/>
                     </a:solidFill>
@@ -10138,7 +10138,7 @@
               </a:ln>
               <a:extLst>
                 <a:ext uri="{91240B29-F687-4f45-9708-019B960494DF}">
-                  <a14:hiddenLine xmlns="" xmlns:a14="http://schemas.microsoft.com/office/drawing/2010/main" w="9525">
+                  <a14:hiddenLine xmlns:a14="http://schemas.microsoft.com/office/drawing/2010/main" xmlns="" w="9525">
                     <a:solidFill>
                       <a:srgbClr val="000000"/>
                     </a:solidFill>
@@ -10200,7 +10200,7 @@
               </a:ln>
               <a:extLst>
                 <a:ext uri="{91240B29-F687-4f45-9708-019B960494DF}">
-                  <a14:hiddenLine xmlns="" xmlns:a14="http://schemas.microsoft.com/office/drawing/2010/main" w="9525">
+                  <a14:hiddenLine xmlns:a14="http://schemas.microsoft.com/office/drawing/2010/main" xmlns="" w="9525">
                     <a:solidFill>
                       <a:srgbClr val="000000"/>
                     </a:solidFill>
@@ -10310,7 +10310,7 @@
               </a:ln>
               <a:extLst>
                 <a:ext uri="{91240B29-F687-4f45-9708-019B960494DF}">
-                  <a14:hiddenLine xmlns="" xmlns:a14="http://schemas.microsoft.com/office/drawing/2010/main" w="9525">
+                  <a14:hiddenLine xmlns:a14="http://schemas.microsoft.com/office/drawing/2010/main" xmlns="" w="9525">
                     <a:solidFill>
                       <a:srgbClr val="000000"/>
                     </a:solidFill>
@@ -10394,7 +10394,7 @@
               </a:ln>
               <a:extLst>
                 <a:ext uri="{91240B29-F687-4f45-9708-019B960494DF}">
-                  <a14:hiddenLine xmlns="" xmlns:a14="http://schemas.microsoft.com/office/drawing/2010/main" w="9525">
+                  <a14:hiddenLine xmlns:a14="http://schemas.microsoft.com/office/drawing/2010/main" xmlns="" w="9525">
                     <a:solidFill>
                       <a:srgbClr val="000000"/>
                     </a:solidFill>
@@ -10456,7 +10456,7 @@
               </a:ln>
               <a:extLst>
                 <a:ext uri="{91240B29-F687-4f45-9708-019B960494DF}">
-                  <a14:hiddenLine xmlns="" xmlns:a14="http://schemas.microsoft.com/office/drawing/2010/main" w="9525">
+                  <a14:hiddenLine xmlns:a14="http://schemas.microsoft.com/office/drawing/2010/main" xmlns="" w="9525">
                     <a:solidFill>
                       <a:srgbClr val="000000"/>
                     </a:solidFill>
@@ -10518,7 +10518,7 @@
               </a:ln>
               <a:extLst>
                 <a:ext uri="{91240B29-F687-4f45-9708-019B960494DF}">
-                  <a14:hiddenLine xmlns="" xmlns:a14="http://schemas.microsoft.com/office/drawing/2010/main" w="9525">
+                  <a14:hiddenLine xmlns:a14="http://schemas.microsoft.com/office/drawing/2010/main" xmlns="" w="9525">
                     <a:solidFill>
                       <a:srgbClr val="000000"/>
                     </a:solidFill>
@@ -10608,7 +10608,7 @@
               </a:ln>
               <a:extLst>
                 <a:ext uri="{91240B29-F687-4f45-9708-019B960494DF}">
-                  <a14:hiddenLine xmlns="" xmlns:a14="http://schemas.microsoft.com/office/drawing/2010/main" w="9525">
+                  <a14:hiddenLine xmlns:a14="http://schemas.microsoft.com/office/drawing/2010/main" xmlns="" w="9525">
                     <a:solidFill>
                       <a:srgbClr val="000000"/>
                     </a:solidFill>
@@ -10642,7 +10642,7 @@
               </a:ln>
               <a:extLst>
                 <a:ext uri="{91240B29-F687-4f45-9708-019B960494DF}">
-                  <a14:hiddenLine xmlns="" xmlns:a14="http://schemas.microsoft.com/office/drawing/2010/main" w="9525">
+                  <a14:hiddenLine xmlns:a14="http://schemas.microsoft.com/office/drawing/2010/main" xmlns="" w="9525">
                     <a:solidFill>
                       <a:srgbClr val="000000"/>
                     </a:solidFill>
@@ -10707,7 +10707,7 @@
               </a:ln>
               <a:extLst>
                 <a:ext uri="{91240B29-F687-4f45-9708-019B960494DF}">
-                  <a14:hiddenLine xmlns="" xmlns:a14="http://schemas.microsoft.com/office/drawing/2010/main" w="9525">
+                  <a14:hiddenLine xmlns:a14="http://schemas.microsoft.com/office/drawing/2010/main" xmlns="" w="9525">
                     <a:solidFill>
                       <a:srgbClr val="000000"/>
                     </a:solidFill>
@@ -10797,7 +10797,7 @@
               </a:ln>
               <a:extLst>
                 <a:ext uri="{91240B29-F687-4f45-9708-019B960494DF}">
-                  <a14:hiddenLine xmlns="" xmlns:a14="http://schemas.microsoft.com/office/drawing/2010/main" w="9525">
+                  <a14:hiddenLine xmlns:a14="http://schemas.microsoft.com/office/drawing/2010/main" xmlns="" w="9525">
                     <a:solidFill>
                       <a:srgbClr val="000000"/>
                     </a:solidFill>
@@ -10859,7 +10859,7 @@
               </a:ln>
               <a:extLst>
                 <a:ext uri="{91240B29-F687-4f45-9708-019B960494DF}">
-                  <a14:hiddenLine xmlns="" xmlns:a14="http://schemas.microsoft.com/office/drawing/2010/main" w="9525">
+                  <a14:hiddenLine xmlns:a14="http://schemas.microsoft.com/office/drawing/2010/main" xmlns="" w="9525">
                     <a:solidFill>
                       <a:srgbClr val="000000"/>
                     </a:solidFill>
@@ -10949,7 +10949,7 @@
               </a:ln>
               <a:extLst>
                 <a:ext uri="{91240B29-F687-4f45-9708-019B960494DF}">
-                  <a14:hiddenLine xmlns="" xmlns:a14="http://schemas.microsoft.com/office/drawing/2010/main" w="9525">
+                  <a14:hiddenLine xmlns:a14="http://schemas.microsoft.com/office/drawing/2010/main" xmlns="" w="9525">
                     <a:solidFill>
                       <a:srgbClr val="000000"/>
                     </a:solidFill>
@@ -11014,7 +11014,7 @@
               </a:ln>
               <a:extLst>
                 <a:ext uri="{91240B29-F687-4f45-9708-019B960494DF}">
-                  <a14:hiddenLine xmlns="" xmlns:a14="http://schemas.microsoft.com/office/drawing/2010/main" w="9525">
+                  <a14:hiddenLine xmlns:a14="http://schemas.microsoft.com/office/drawing/2010/main" xmlns="" w="9525">
                     <a:solidFill>
                       <a:srgbClr val="000000"/>
                     </a:solidFill>
@@ -11076,7 +11076,7 @@
               </a:ln>
               <a:extLst>
                 <a:ext uri="{91240B29-F687-4f45-9708-019B960494DF}">
-                  <a14:hiddenLine xmlns="" xmlns:a14="http://schemas.microsoft.com/office/drawing/2010/main" w="9525">
+                  <a14:hiddenLine xmlns:a14="http://schemas.microsoft.com/office/drawing/2010/main" xmlns="" w="9525">
                     <a:solidFill>
                       <a:srgbClr val="000000"/>
                     </a:solidFill>
@@ -11166,7 +11166,7 @@
               </a:ln>
               <a:extLst>
                 <a:ext uri="{91240B29-F687-4f45-9708-019B960494DF}">
-                  <a14:hiddenLine xmlns="" xmlns:a14="http://schemas.microsoft.com/office/drawing/2010/main" w="9525">
+                  <a14:hiddenLine xmlns:a14="http://schemas.microsoft.com/office/drawing/2010/main" xmlns="" w="9525">
                     <a:solidFill>
                       <a:srgbClr val="000000"/>
                     </a:solidFill>
@@ -11256,7 +11256,7 @@
               </a:ln>
               <a:extLst>
                 <a:ext uri="{91240B29-F687-4f45-9708-019B960494DF}">
-                  <a14:hiddenLine xmlns="" xmlns:a14="http://schemas.microsoft.com/office/drawing/2010/main" w="9525">
+                  <a14:hiddenLine xmlns:a14="http://schemas.microsoft.com/office/drawing/2010/main" xmlns="" w="9525">
                     <a:solidFill>
                       <a:srgbClr val="000000"/>
                     </a:solidFill>
@@ -11321,7 +11321,7 @@
               </a:ln>
               <a:extLst>
                 <a:ext uri="{91240B29-F687-4f45-9708-019B960494DF}">
-                  <a14:hiddenLine xmlns="" xmlns:a14="http://schemas.microsoft.com/office/drawing/2010/main" w="9525">
+                  <a14:hiddenLine xmlns:a14="http://schemas.microsoft.com/office/drawing/2010/main" xmlns="" w="9525">
                     <a:solidFill>
                       <a:srgbClr val="000000"/>
                     </a:solidFill>
@@ -11441,7 +11441,7 @@
               </a:ln>
               <a:extLst>
                 <a:ext uri="{91240B29-F687-4f45-9708-019B960494DF}">
-                  <a14:hiddenLine xmlns="" xmlns:a14="http://schemas.microsoft.com/office/drawing/2010/main" w="9525">
+                  <a14:hiddenLine xmlns:a14="http://schemas.microsoft.com/office/drawing/2010/main" xmlns="" w="9525">
                     <a:solidFill>
                       <a:srgbClr val="000000"/>
                     </a:solidFill>
@@ -11539,7 +11539,7 @@
               </a:ln>
               <a:extLst>
                 <a:ext uri="{91240B29-F687-4f45-9708-019B960494DF}">
-                  <a14:hiddenLine xmlns="" xmlns:a14="http://schemas.microsoft.com/office/drawing/2010/main" w="9525">
+                  <a14:hiddenLine xmlns:a14="http://schemas.microsoft.com/office/drawing/2010/main" xmlns="" w="9525">
                     <a:solidFill>
                       <a:srgbClr val="000000"/>
                     </a:solidFill>
@@ -11654,7 +11654,7 @@
               </a:ln>
               <a:extLst>
                 <a:ext uri="{91240B29-F687-4f45-9708-019B960494DF}">
-                  <a14:hiddenLine xmlns="" xmlns:a14="http://schemas.microsoft.com/office/drawing/2010/main" w="9525">
+                  <a14:hiddenLine xmlns:a14="http://schemas.microsoft.com/office/drawing/2010/main" xmlns="" w="9525">
                     <a:solidFill>
                       <a:srgbClr val="000000"/>
                     </a:solidFill>
@@ -11744,7 +11744,7 @@
               </a:ln>
               <a:extLst>
                 <a:ext uri="{91240B29-F687-4f45-9708-019B960494DF}">
-                  <a14:hiddenLine xmlns="" xmlns:a14="http://schemas.microsoft.com/office/drawing/2010/main" w="9525">
+                  <a14:hiddenLine xmlns:a14="http://schemas.microsoft.com/office/drawing/2010/main" xmlns="" w="9525">
                     <a:solidFill>
                       <a:srgbClr val="000000"/>
                     </a:solidFill>
@@ -11809,7 +11809,7 @@
               </a:ln>
               <a:extLst>
                 <a:ext uri="{91240B29-F687-4f45-9708-019B960494DF}">
-                  <a14:hiddenLine xmlns="" xmlns:a14="http://schemas.microsoft.com/office/drawing/2010/main" w="9525">
+                  <a14:hiddenLine xmlns:a14="http://schemas.microsoft.com/office/drawing/2010/main" xmlns="" w="9525">
                     <a:solidFill>
                       <a:srgbClr val="000000"/>
                     </a:solidFill>
@@ -11899,7 +11899,7 @@
               </a:ln>
               <a:extLst>
                 <a:ext uri="{91240B29-F687-4f45-9708-019B960494DF}">
-                  <a14:hiddenLine xmlns="" xmlns:a14="http://schemas.microsoft.com/office/drawing/2010/main" w="9525">
+                  <a14:hiddenLine xmlns:a14="http://schemas.microsoft.com/office/drawing/2010/main" xmlns="" w="9525">
                     <a:solidFill>
                       <a:srgbClr val="000000"/>
                     </a:solidFill>
@@ -11967,7 +11967,7 @@
               </a:ln>
               <a:extLst>
                 <a:ext uri="{91240B29-F687-4f45-9708-019B960494DF}">
-                  <a14:hiddenLine xmlns="" xmlns:a14="http://schemas.microsoft.com/office/drawing/2010/main" w="9525">
+                  <a14:hiddenLine xmlns:a14="http://schemas.microsoft.com/office/drawing/2010/main" xmlns="" w="9525">
                     <a:solidFill>
                       <a:srgbClr val="000000"/>
                     </a:solidFill>
@@ -12057,7 +12057,7 @@
               </a:ln>
               <a:extLst>
                 <a:ext uri="{91240B29-F687-4f45-9708-019B960494DF}">
-                  <a14:hiddenLine xmlns="" xmlns:a14="http://schemas.microsoft.com/office/drawing/2010/main" w="9525">
+                  <a14:hiddenLine xmlns:a14="http://schemas.microsoft.com/office/drawing/2010/main" xmlns="" w="9525">
                     <a:solidFill>
                       <a:srgbClr val="000000"/>
                     </a:solidFill>
@@ -12125,7 +12125,7 @@
               </a:ln>
               <a:extLst>
                 <a:ext uri="{91240B29-F687-4f45-9708-019B960494DF}">
-                  <a14:hiddenLine xmlns="" xmlns:a14="http://schemas.microsoft.com/office/drawing/2010/main" w="9525">
+                  <a14:hiddenLine xmlns:a14="http://schemas.microsoft.com/office/drawing/2010/main" xmlns="" w="9525">
                     <a:solidFill>
                       <a:srgbClr val="000000"/>
                     </a:solidFill>
@@ -12215,7 +12215,7 @@
               </a:ln>
               <a:extLst>
                 <a:ext uri="{91240B29-F687-4f45-9708-019B960494DF}">
-                  <a14:hiddenLine xmlns="" xmlns:a14="http://schemas.microsoft.com/office/drawing/2010/main" w="9525">
+                  <a14:hiddenLine xmlns:a14="http://schemas.microsoft.com/office/drawing/2010/main" xmlns="" w="9525">
                     <a:solidFill>
                       <a:srgbClr val="000000"/>
                     </a:solidFill>
@@ -12249,7 +12249,7 @@
               </a:ln>
               <a:extLst>
                 <a:ext uri="{91240B29-F687-4f45-9708-019B960494DF}">
-                  <a14:hiddenLine xmlns="" xmlns:a14="http://schemas.microsoft.com/office/drawing/2010/main" w="9525">
+                  <a14:hiddenLine xmlns:a14="http://schemas.microsoft.com/office/drawing/2010/main" xmlns="" w="9525">
                     <a:solidFill>
                       <a:srgbClr val="000000"/>
                     </a:solidFill>
@@ -12389,7 +12389,7 @@
           <a:p>
             <a:fld id="{39FE0B3A-34ED-40B6-BAE9-507955185073}" type="datetimeFigureOut">
               <a:rPr lang="en-BE" smtClean="0"/>
-              <a:t>21/01/2024</a:t>
+              <a:t>23/01/2024</a:t>
             </a:fld>
             <a:endParaRPr lang="en-BE"/>
           </a:p>
@@ -14343,6 +14343,50 @@
           </a:p>
         </p:txBody>
       </p:sp>
+      <p:sp>
+        <p:nvSpPr>
+          <p:cNvPr id="3" name="TextBox 2">
+            <a:extLst>
+              <a:ext uri="{FF2B5EF4-FFF2-40B4-BE49-F238E27FC236}">
+                <a16:creationId xmlns:a16="http://schemas.microsoft.com/office/drawing/2014/main" id="{CAAF2BCE-4D30-6153-208C-62D3C3724CC1}"/>
+              </a:ext>
+            </a:extLst>
+          </p:cNvPr>
+          <p:cNvSpPr txBox="1"/>
+          <p:nvPr/>
+        </p:nvSpPr>
+        <p:spPr>
+          <a:xfrm>
+            <a:off x="951723" y="6413360"/>
+            <a:ext cx="3489649" cy="276999"/>
+          </a:xfrm>
+          <a:prstGeom prst="rect">
+            <a:avLst/>
+          </a:prstGeom>
+          <a:noFill/>
+        </p:spPr>
+        <p:txBody>
+          <a:bodyPr wrap="square" rtlCol="0">
+            <a:spAutoFit/>
+          </a:bodyPr>
+          <a:lstStyle/>
+          <a:p>
+            <a:r>
+              <a:rPr lang="en-US" sz="1200" dirty="0">
+                <a:solidFill>
+                  <a:schemeClr val="bg1"/>
+                </a:solidFill>
+              </a:rPr>
+              <a:t>From https://developer.okta.com</a:t>
+            </a:r>
+            <a:endParaRPr lang="en-BE" sz="1200" dirty="0">
+              <a:solidFill>
+                <a:schemeClr val="bg1"/>
+              </a:solidFill>
+            </a:endParaRPr>
+          </a:p>
+        </p:txBody>
+      </p:sp>
     </p:spTree>
     <p:extLst>
       <p:ext uri="{BB962C8B-B14F-4D97-AF65-F5344CB8AC3E}">
@@ -15021,6 +15065,50 @@
           </a:p>
         </p:txBody>
       </p:sp>
+      <p:sp>
+        <p:nvSpPr>
+          <p:cNvPr id="3" name="TextBox 2">
+            <a:extLst>
+              <a:ext uri="{FF2B5EF4-FFF2-40B4-BE49-F238E27FC236}">
+                <a16:creationId xmlns:a16="http://schemas.microsoft.com/office/drawing/2014/main" id="{40FED6CA-01CD-93A1-3610-3B34BE1BA2F5}"/>
+              </a:ext>
+            </a:extLst>
+          </p:cNvPr>
+          <p:cNvSpPr txBox="1"/>
+          <p:nvPr/>
+        </p:nvSpPr>
+        <p:spPr>
+          <a:xfrm>
+            <a:off x="1129004" y="6522720"/>
+            <a:ext cx="3489649" cy="276999"/>
+          </a:xfrm>
+          <a:prstGeom prst="rect">
+            <a:avLst/>
+          </a:prstGeom>
+          <a:noFill/>
+        </p:spPr>
+        <p:txBody>
+          <a:bodyPr wrap="square" rtlCol="0">
+            <a:spAutoFit/>
+          </a:bodyPr>
+          <a:lstStyle/>
+          <a:p>
+            <a:r>
+              <a:rPr lang="en-US" sz="1200" dirty="0">
+                <a:solidFill>
+                  <a:schemeClr val="bg1"/>
+                </a:solidFill>
+              </a:rPr>
+              <a:t>From https://developer.okta.com</a:t>
+            </a:r>
+            <a:endParaRPr lang="en-BE" sz="1200" dirty="0">
+              <a:solidFill>
+                <a:schemeClr val="bg1"/>
+              </a:solidFill>
+            </a:endParaRPr>
+          </a:p>
+        </p:txBody>
+      </p:sp>
     </p:spTree>
     <p:extLst>
       <p:ext uri="{BB962C8B-B14F-4D97-AF65-F5344CB8AC3E}">
@@ -15920,7 +16008,7 @@
             </a:pPr>
             <a:r>
               <a:rPr lang="en-US" dirty="0"/>
-              <a:t>https://twitter.com/alexxubyte/status/1696180531266715815/photo/1</a:t>
+              <a:t>https://developer.okta.com/docs/guides/implement-grant-type/authcode/main/</a:t>
             </a:r>
           </a:p>
           <a:p>

</xml_diff>